<commit_message>
Complete text in one pdf
</commit_message>
<xml_diff>
--- a/Class Slides 2024/Class 24.pptx
+++ b/Class Slides 2024/Class 24.pptx
@@ -3396,13 +3396,8 @@
             <a:pPr lvl="1"/>
             <a:r>
               <a:rPr lang="en-US" dirty="0"/>
-              <a:t>Post links to your procedures or </a:t>
-            </a:r>
-            <a:r>
-              <a:rPr lang="en-US"/>
-              <a:t>printed materials</a:t>
-            </a:r>
-            <a:endParaRPr lang="en-US" dirty="0"/>
+              <a:t>Post links to your procedures or printed materials</a:t>
+            </a:r>
           </a:p>
           <a:p>
             <a:endParaRPr lang="en-US" dirty="0"/>
@@ -3820,14 +3815,18 @@
           <a:p>
             <a:r>
               <a:rPr lang="en-US" dirty="0"/>
-              <a:t>Aim for 5-8 minutes</a:t>
+              <a:t>Aim for 10-12 minutes</a:t>
             </a:r>
           </a:p>
           <a:p>
             <a:pPr lvl="1"/>
             <a:r>
-              <a:rPr lang="en-US" dirty="0"/>
-              <a:t>5 groups/hour with questions</a:t>
+              <a:rPr lang="en-US"/>
+              <a:t>3 </a:t>
+            </a:r>
+            <a:r>
+              <a:rPr lang="en-US" dirty="0"/>
+              <a:t>groups/hour with questions</a:t>
             </a:r>
           </a:p>
         </p:txBody>
@@ -4627,7 +4626,7 @@
             <a:pPr lvl="1"/>
             <a:r>
               <a:rPr lang="en-US" dirty="0"/>
-              <a:t>Non-experimental</a:t>
+              <a:t>Observational, non-experimental</a:t>
             </a:r>
           </a:p>
           <a:p>
@@ -4637,7 +4636,7 @@
           <a:p>
             <a:r>
               <a:rPr lang="en-US" dirty="0"/>
-              <a:t>Drive theory and subsequent experimental research</a:t>
+              <a:t>Generate theory and inspire subsequent experimental research</a:t>
             </a:r>
           </a:p>
           <a:p>

</xml_diff>